<commit_message>
LO-DI: update to match the current codebase
The LO refers to changing the implementation of the `Logic` (now
`LogicManager`) class so that it depends on the abstract class `Storage`
instead of the concrete class `StorageFile` (now `StorageManager`).

However, in the current codebase, the `LogicManager` class already
depends on the interface `Storage`, so students would not need to do the
above anymore. Update the LO and its diagrams to take this into account.

The other part of the exercise (implementing a `StorageStub` class) is
still applicable.

While we are updating the diagrams, also update the colors used so that
it matches the class diagrams in the developer guide.
</commit_message>
<xml_diff>
--- a/docs/diagrams/DependencyInjection.pptx
+++ b/docs/diagrams/DependencyInjection.pptx
@@ -208,7 +208,7 @@
           <a:p>
             <a:fld id="{F5CC4B3F-88C1-4FFA-B1B6-F41C21DC6924}" type="datetimeFigureOut">
               <a:rPr lang="en-US" smtClean="0"/>
-              <a:t>5/29/2019</a:t>
+              <a:t>6/17/2019</a:t>
             </a:fld>
             <a:endParaRPr lang="en-US"/>
           </a:p>
@@ -654,7 +654,7 @@
           <a:p>
             <a:fld id="{78C97017-6FC3-485B-9764-EAC9E56C1D49}" type="datetimeFigureOut">
               <a:rPr lang="en-US" smtClean="0"/>
-              <a:t>5/29/2019</a:t>
+              <a:t>6/17/2019</a:t>
             </a:fld>
             <a:endParaRPr lang="en-US"/>
           </a:p>
@@ -822,7 +822,7 @@
           <a:p>
             <a:fld id="{78C97017-6FC3-485B-9764-EAC9E56C1D49}" type="datetimeFigureOut">
               <a:rPr lang="en-US" smtClean="0"/>
-              <a:t>5/29/2019</a:t>
+              <a:t>6/17/2019</a:t>
             </a:fld>
             <a:endParaRPr lang="en-US"/>
           </a:p>
@@ -1000,7 +1000,7 @@
           <a:p>
             <a:fld id="{78C97017-6FC3-485B-9764-EAC9E56C1D49}" type="datetimeFigureOut">
               <a:rPr lang="en-US" smtClean="0"/>
-              <a:t>5/29/2019</a:t>
+              <a:t>6/17/2019</a:t>
             </a:fld>
             <a:endParaRPr lang="en-US"/>
           </a:p>
@@ -1168,7 +1168,7 @@
           <a:p>
             <a:fld id="{78C97017-6FC3-485B-9764-EAC9E56C1D49}" type="datetimeFigureOut">
               <a:rPr lang="en-US" smtClean="0"/>
-              <a:t>5/29/2019</a:t>
+              <a:t>6/17/2019</a:t>
             </a:fld>
             <a:endParaRPr lang="en-US"/>
           </a:p>
@@ -1413,7 +1413,7 @@
           <a:p>
             <a:fld id="{78C97017-6FC3-485B-9764-EAC9E56C1D49}" type="datetimeFigureOut">
               <a:rPr lang="en-US" smtClean="0"/>
-              <a:t>5/29/2019</a:t>
+              <a:t>6/17/2019</a:t>
             </a:fld>
             <a:endParaRPr lang="en-US"/>
           </a:p>
@@ -1698,7 +1698,7 @@
           <a:p>
             <a:fld id="{78C97017-6FC3-485B-9764-EAC9E56C1D49}" type="datetimeFigureOut">
               <a:rPr lang="en-US" smtClean="0"/>
-              <a:t>5/29/2019</a:t>
+              <a:t>6/17/2019</a:t>
             </a:fld>
             <a:endParaRPr lang="en-US"/>
           </a:p>
@@ -2117,7 +2117,7 @@
           <a:p>
             <a:fld id="{78C97017-6FC3-485B-9764-EAC9E56C1D49}" type="datetimeFigureOut">
               <a:rPr lang="en-US" smtClean="0"/>
-              <a:t>5/29/2019</a:t>
+              <a:t>6/17/2019</a:t>
             </a:fld>
             <a:endParaRPr lang="en-US"/>
           </a:p>
@@ -2234,7 +2234,7 @@
           <a:p>
             <a:fld id="{78C97017-6FC3-485B-9764-EAC9E56C1D49}" type="datetimeFigureOut">
               <a:rPr lang="en-US" smtClean="0"/>
-              <a:t>5/29/2019</a:t>
+              <a:t>6/17/2019</a:t>
             </a:fld>
             <a:endParaRPr lang="en-US"/>
           </a:p>
@@ -2329,7 +2329,7 @@
           <a:p>
             <a:fld id="{78C97017-6FC3-485B-9764-EAC9E56C1D49}" type="datetimeFigureOut">
               <a:rPr lang="en-US" smtClean="0"/>
-              <a:t>5/29/2019</a:t>
+              <a:t>6/17/2019</a:t>
             </a:fld>
             <a:endParaRPr lang="en-US"/>
           </a:p>
@@ -2604,7 +2604,7 @@
           <a:p>
             <a:fld id="{78C97017-6FC3-485B-9764-EAC9E56C1D49}" type="datetimeFigureOut">
               <a:rPr lang="en-US" smtClean="0"/>
-              <a:t>5/29/2019</a:t>
+              <a:t>6/17/2019</a:t>
             </a:fld>
             <a:endParaRPr lang="en-US"/>
           </a:p>
@@ -2856,7 +2856,7 @@
           <a:p>
             <a:fld id="{78C97017-6FC3-485B-9764-EAC9E56C1D49}" type="datetimeFigureOut">
               <a:rPr lang="en-US" smtClean="0"/>
-              <a:t>5/29/2019</a:t>
+              <a:t>6/17/2019</a:t>
             </a:fld>
             <a:endParaRPr lang="en-US"/>
           </a:p>
@@ -3067,7 +3067,7 @@
           <a:p>
             <a:fld id="{78C97017-6FC3-485B-9764-EAC9E56C1D49}" type="datetimeFigureOut">
               <a:rPr lang="en-US" smtClean="0"/>
-              <a:t>5/29/2019</a:t>
+              <a:t>6/17/2019</a:t>
             </a:fld>
             <a:endParaRPr lang="en-US"/>
           </a:p>
@@ -3442,71 +3442,6 @@
           <a:chExt cx="0" cy="0"/>
         </a:xfrm>
       </p:grpSpPr>
-      <p:sp>
-        <p:nvSpPr>
-          <p:cNvPr id="2" name="Rectangle 22">
-            <a:extLst>
-              <a:ext uri="{FF2B5EF4-FFF2-40B4-BE49-F238E27FC236}">
-                <a16:creationId xmlns:a16="http://schemas.microsoft.com/office/drawing/2014/main" id="{28F0E722-9301-4EEB-9ECC-BF86ACD4456C}"/>
-              </a:ext>
-            </a:extLst>
-          </p:cNvPr>
-          <p:cNvSpPr/>
-          <p:nvPr/>
-        </p:nvSpPr>
-        <p:spPr>
-          <a:xfrm>
-            <a:off x="2984835" y="3365314"/>
-            <a:ext cx="790193" cy="346760"/>
-          </a:xfrm>
-          <a:prstGeom prst="rect">
-            <a:avLst/>
-          </a:prstGeom>
-          <a:solidFill>
-            <a:srgbClr val="00B050"/>
-          </a:solidFill>
-          <a:ln w="19050">
-            <a:solidFill>
-              <a:srgbClr val="00B050"/>
-            </a:solidFill>
-          </a:ln>
-          <a:effectLst/>
-        </p:spPr>
-        <p:style>
-          <a:lnRef idx="1">
-            <a:schemeClr val="accent2"/>
-          </a:lnRef>
-          <a:fillRef idx="2">
-            <a:schemeClr val="accent2"/>
-          </a:fillRef>
-          <a:effectRef idx="1">
-            <a:schemeClr val="accent2"/>
-          </a:effectRef>
-          <a:fontRef idx="minor">
-            <a:schemeClr val="dk1"/>
-          </a:fontRef>
-        </p:style>
-        <p:txBody>
-          <a:bodyPr rtlCol="0" anchor="ctr"/>
-          <a:lstStyle/>
-          <a:p>
-            <a:pPr algn="ctr"/>
-            <a:r>
-              <a:rPr lang="en-US" sz="1050" dirty="0" err="1">
-                <a:solidFill>
-                  <a:schemeClr val="bg1"/>
-                </a:solidFill>
-              </a:rPr>
-              <a:t>StorageFile</a:t>
-            </a:r>
-            <a:endParaRPr lang="en-SG" sz="1050" dirty="0">
-              <a:solidFill>
-                <a:schemeClr val="bg1"/>
-              </a:solidFill>
-            </a:endParaRPr>
-          </a:p>
-        </p:txBody>
-      </p:sp>
       <p:cxnSp>
         <p:nvCxnSpPr>
           <p:cNvPr id="3" name="Elbow Connector 40">
@@ -3517,20 +3452,19 @@
             </a:extLst>
           </p:cNvPr>
           <p:cNvCxnSpPr>
+            <a:cxnSpLocks/>
             <a:stCxn id="4" idx="2"/>
-            <a:endCxn id="2" idx="0"/>
+            <a:endCxn id="31" idx="0"/>
           </p:cNvCxnSpPr>
           <p:nvPr/>
         </p:nvCxnSpPr>
         <p:spPr>
-          <a:xfrm rot="16200000" flipH="1">
-            <a:off x="3221444" y="3206825"/>
-            <a:ext cx="316975" cy="1"/>
+          <a:xfrm>
+            <a:off x="3377554" y="3033412"/>
+            <a:ext cx="1" cy="269232"/>
           </a:xfrm>
-          <a:prstGeom prst="bentConnector3">
-            <a:avLst>
-              <a:gd name="adj1" fmla="val 50000"/>
-            </a:avLst>
+          <a:prstGeom prst="straightConnector1">
+            <a:avLst/>
           </a:prstGeom>
           <a:ln w="19050">
             <a:solidFill>
@@ -3570,8 +3504,8 @@
         </p:nvSpPr>
         <p:spPr>
           <a:xfrm>
-            <a:off x="2984835" y="2605727"/>
-            <a:ext cx="790192" cy="442612"/>
+            <a:off x="2834522" y="2590800"/>
+            <a:ext cx="1086064" cy="442612"/>
           </a:xfrm>
           <a:prstGeom prst="rect">
             <a:avLst/>
@@ -3606,12 +3540,12 @@
           <a:p>
             <a:pPr algn="ctr"/>
             <a:r>
-              <a:rPr lang="en-US" sz="1050" dirty="0">
+              <a:rPr lang="en-US" sz="1050" dirty="0" err="1">
                 <a:solidFill>
                   <a:schemeClr val="bg1"/>
                 </a:solidFill>
               </a:rPr>
-              <a:t>Logic</a:t>
+              <a:t>LogicManager</a:t>
             </a:r>
             <a:endParaRPr lang="en-SG" sz="1050" dirty="0">
               <a:solidFill>
@@ -3635,8 +3569,8 @@
         </p:nvSpPr>
         <p:spPr>
           <a:xfrm>
-            <a:off x="1484409" y="2612076"/>
-            <a:ext cx="790192" cy="442612"/>
+            <a:off x="1107424" y="2597149"/>
+            <a:ext cx="1207795" cy="442612"/>
           </a:xfrm>
           <a:prstGeom prst="rect">
             <a:avLst/>
@@ -3668,7 +3602,7 @@
                   <a:srgbClr val="0070C0"/>
                 </a:solidFill>
               </a:rPr>
-              <a:t>LogicTest</a:t>
+              <a:t>LogicManagerTest</a:t>
             </a:r>
             <a:endParaRPr lang="en-SG" sz="1050" dirty="0">
               <a:solidFill>
@@ -3688,6 +3622,7 @@
             </a:extLst>
           </p:cNvPr>
           <p:cNvCxnSpPr>
+            <a:cxnSpLocks/>
             <a:stCxn id="5" idx="3"/>
             <a:endCxn id="4" idx="1"/>
           </p:cNvCxnSpPr>
@@ -3695,13 +3630,11 @@
         </p:nvCxnSpPr>
         <p:spPr>
           <a:xfrm flipV="1">
-            <a:off x="2274601" y="2827033"/>
-            <a:ext cx="710234" cy="6349"/>
+            <a:off x="2315219" y="2812106"/>
+            <a:ext cx="519303" cy="6349"/>
           </a:xfrm>
-          <a:prstGeom prst="bentConnector3">
-            <a:avLst>
-              <a:gd name="adj1" fmla="val 50000"/>
-            </a:avLst>
+          <a:prstGeom prst="straightConnector1">
+            <a:avLst/>
           </a:prstGeom>
           <a:ln w="19050">
             <a:solidFill>
@@ -3738,15 +3671,16 @@
             </a:extLst>
           </p:cNvPr>
           <p:cNvCxnSpPr>
+            <a:cxnSpLocks/>
             <a:stCxn id="5" idx="2"/>
-            <a:endCxn id="2" idx="1"/>
+            <a:endCxn id="35" idx="1"/>
           </p:cNvCxnSpPr>
           <p:nvPr/>
         </p:nvCxnSpPr>
         <p:spPr>
           <a:xfrm rot="16200000" flipH="1">
-            <a:off x="2190167" y="2744026"/>
-            <a:ext cx="484006" cy="1105330"/>
+            <a:off x="1705214" y="3045868"/>
+            <a:ext cx="1124806" cy="1112591"/>
           </a:xfrm>
           <a:prstGeom prst="bentConnector2">
             <a:avLst/>
@@ -3778,633 +3712,6 @@
       </p:cxnSp>
       <p:sp>
         <p:nvSpPr>
-          <p:cNvPr id="8" name="Rectangle 22">
-            <a:extLst>
-              <a:ext uri="{FF2B5EF4-FFF2-40B4-BE49-F238E27FC236}">
-                <a16:creationId xmlns:a16="http://schemas.microsoft.com/office/drawing/2014/main" id="{D39A943A-4A04-46EA-9862-8E89B5A26C84}"/>
-              </a:ext>
-            </a:extLst>
-          </p:cNvPr>
-          <p:cNvSpPr/>
-          <p:nvPr/>
-        </p:nvSpPr>
-        <p:spPr>
-          <a:xfrm>
-            <a:off x="6400800" y="3344038"/>
-            <a:ext cx="790193" cy="346760"/>
-          </a:xfrm>
-          <a:prstGeom prst="rect">
-            <a:avLst/>
-          </a:prstGeom>
-          <a:solidFill>
-            <a:srgbClr val="0070C0"/>
-          </a:solidFill>
-          <a:ln w="19050">
-            <a:solidFill>
-              <a:srgbClr val="0070C0"/>
-            </a:solidFill>
-          </a:ln>
-          <a:effectLst/>
-        </p:spPr>
-        <p:style>
-          <a:lnRef idx="1">
-            <a:schemeClr val="accent2"/>
-          </a:lnRef>
-          <a:fillRef idx="2">
-            <a:schemeClr val="accent2"/>
-          </a:fillRef>
-          <a:effectRef idx="1">
-            <a:schemeClr val="accent2"/>
-          </a:effectRef>
-          <a:fontRef idx="minor">
-            <a:schemeClr val="dk1"/>
-          </a:fontRef>
-        </p:style>
-        <p:txBody>
-          <a:bodyPr rtlCol="0" anchor="ctr"/>
-          <a:lstStyle/>
-          <a:p>
-            <a:pPr algn="ctr"/>
-            <a:r>
-              <a:rPr lang="en-US" sz="1050" dirty="0">
-                <a:solidFill>
-                  <a:schemeClr val="bg1"/>
-                </a:solidFill>
-              </a:rPr>
-              <a:t>{abstract}</a:t>
-            </a:r>
-            <a:br>
-              <a:rPr lang="en-US" sz="1050" dirty="0">
-                <a:solidFill>
-                  <a:schemeClr val="bg1"/>
-                </a:solidFill>
-              </a:rPr>
-            </a:br>
-            <a:r>
-              <a:rPr lang="en-US" sz="1050" dirty="0">
-                <a:solidFill>
-                  <a:schemeClr val="bg1"/>
-                </a:solidFill>
-              </a:rPr>
-              <a:t>Storage</a:t>
-            </a:r>
-            <a:endParaRPr lang="en-SG" sz="1050" dirty="0">
-              <a:solidFill>
-                <a:schemeClr val="bg1"/>
-              </a:solidFill>
-            </a:endParaRPr>
-          </a:p>
-        </p:txBody>
-      </p:sp>
-      <p:cxnSp>
-        <p:nvCxnSpPr>
-          <p:cNvPr id="9" name="Elbow Connector 40">
-            <a:extLst>
-              <a:ext uri="{FF2B5EF4-FFF2-40B4-BE49-F238E27FC236}">
-                <a16:creationId xmlns:a16="http://schemas.microsoft.com/office/drawing/2014/main" id="{A483F5A6-0537-474B-833A-CD6BC3AF2CD3}"/>
-              </a:ext>
-            </a:extLst>
-          </p:cNvPr>
-          <p:cNvCxnSpPr>
-            <a:stCxn id="10" idx="2"/>
-            <a:endCxn id="8" idx="0"/>
-          </p:cNvCxnSpPr>
-          <p:nvPr/>
-        </p:nvCxnSpPr>
-        <p:spPr>
-          <a:xfrm rot="16200000" flipH="1">
-            <a:off x="6637409" y="3185549"/>
-            <a:ext cx="316975" cy="1"/>
-          </a:xfrm>
-          <a:prstGeom prst="bentConnector3">
-            <a:avLst>
-              <a:gd name="adj1" fmla="val 50000"/>
-            </a:avLst>
-          </a:prstGeom>
-          <a:ln w="19050">
-            <a:solidFill>
-              <a:srgbClr val="0070C0"/>
-            </a:solidFill>
-            <a:headEnd type="none" w="med" len="med"/>
-            <a:tailEnd type="arrow" w="med" len="med"/>
-          </a:ln>
-          <a:effectLst/>
-        </p:spPr>
-        <p:style>
-          <a:lnRef idx="1">
-            <a:schemeClr val="accent2"/>
-          </a:lnRef>
-          <a:fillRef idx="2">
-            <a:schemeClr val="accent2"/>
-          </a:fillRef>
-          <a:effectRef idx="1">
-            <a:schemeClr val="accent2"/>
-          </a:effectRef>
-          <a:fontRef idx="minor">
-            <a:schemeClr val="dk1"/>
-          </a:fontRef>
-        </p:style>
-      </p:cxnSp>
-      <p:sp>
-        <p:nvSpPr>
-          <p:cNvPr id="10" name="Rectangle 65">
-            <a:extLst>
-              <a:ext uri="{FF2B5EF4-FFF2-40B4-BE49-F238E27FC236}">
-                <a16:creationId xmlns:a16="http://schemas.microsoft.com/office/drawing/2014/main" id="{DE778895-9549-487A-A3DB-905D81E2C988}"/>
-              </a:ext>
-            </a:extLst>
-          </p:cNvPr>
-          <p:cNvSpPr/>
-          <p:nvPr/>
-        </p:nvSpPr>
-        <p:spPr>
-          <a:xfrm>
-            <a:off x="6400800" y="2584451"/>
-            <a:ext cx="790192" cy="442612"/>
-          </a:xfrm>
-          <a:prstGeom prst="rect">
-            <a:avLst/>
-          </a:prstGeom>
-          <a:solidFill>
-            <a:srgbClr val="0070C0"/>
-          </a:solidFill>
-          <a:ln w="19050">
-            <a:solidFill>
-              <a:srgbClr val="0070C0"/>
-            </a:solidFill>
-          </a:ln>
-          <a:effectLst/>
-        </p:spPr>
-        <p:style>
-          <a:lnRef idx="1">
-            <a:schemeClr val="accent2"/>
-          </a:lnRef>
-          <a:fillRef idx="2">
-            <a:schemeClr val="accent2"/>
-          </a:fillRef>
-          <a:effectRef idx="1">
-            <a:schemeClr val="accent2"/>
-          </a:effectRef>
-          <a:fontRef idx="minor">
-            <a:schemeClr val="dk1"/>
-          </a:fontRef>
-        </p:style>
-        <p:txBody>
-          <a:bodyPr rtlCol="0" anchor="ctr"/>
-          <a:lstStyle/>
-          <a:p>
-            <a:pPr algn="ctr"/>
-            <a:r>
-              <a:rPr lang="en-US" sz="1050" dirty="0">
-                <a:solidFill>
-                  <a:schemeClr val="bg1"/>
-                </a:solidFill>
-              </a:rPr>
-              <a:t>Logic</a:t>
-            </a:r>
-            <a:endParaRPr lang="en-SG" sz="1050" dirty="0">
-              <a:solidFill>
-                <a:schemeClr val="bg1"/>
-              </a:solidFill>
-            </a:endParaRPr>
-          </a:p>
-        </p:txBody>
-      </p:sp>
-      <p:sp>
-        <p:nvSpPr>
-          <p:cNvPr id="11" name="Rectangle 65">
-            <a:extLst>
-              <a:ext uri="{FF2B5EF4-FFF2-40B4-BE49-F238E27FC236}">
-                <a16:creationId xmlns:a16="http://schemas.microsoft.com/office/drawing/2014/main" id="{7E19468F-DD04-4FDA-B2E7-D48F1616B6EE}"/>
-              </a:ext>
-            </a:extLst>
-          </p:cNvPr>
-          <p:cNvSpPr/>
-          <p:nvPr/>
-        </p:nvSpPr>
-        <p:spPr>
-          <a:xfrm>
-            <a:off x="4724400" y="2590800"/>
-            <a:ext cx="790192" cy="442612"/>
-          </a:xfrm>
-          <a:prstGeom prst="rect">
-            <a:avLst/>
-          </a:prstGeom>
-          <a:ln/>
-        </p:spPr>
-        <p:style>
-          <a:lnRef idx="2">
-            <a:schemeClr val="accent1"/>
-          </a:lnRef>
-          <a:fillRef idx="1">
-            <a:schemeClr val="lt1"/>
-          </a:fillRef>
-          <a:effectRef idx="0">
-            <a:schemeClr val="accent1"/>
-          </a:effectRef>
-          <a:fontRef idx="minor">
-            <a:schemeClr val="dk1"/>
-          </a:fontRef>
-        </p:style>
-        <p:txBody>
-          <a:bodyPr rtlCol="0" anchor="ctr"/>
-          <a:lstStyle/>
-          <a:p>
-            <a:pPr algn="ctr"/>
-            <a:r>
-              <a:rPr lang="en-US" sz="1050" dirty="0" err="1">
-                <a:solidFill>
-                  <a:srgbClr val="0070C0"/>
-                </a:solidFill>
-              </a:rPr>
-              <a:t>LogicTest</a:t>
-            </a:r>
-            <a:endParaRPr lang="en-SG" sz="1050" dirty="0">
-              <a:solidFill>
-                <a:srgbClr val="0070C0"/>
-              </a:solidFill>
-            </a:endParaRPr>
-          </a:p>
-        </p:txBody>
-      </p:sp>
-      <p:cxnSp>
-        <p:nvCxnSpPr>
-          <p:cNvPr id="12" name="Elbow Connector 40">
-            <a:extLst>
-              <a:ext uri="{FF2B5EF4-FFF2-40B4-BE49-F238E27FC236}">
-                <a16:creationId xmlns:a16="http://schemas.microsoft.com/office/drawing/2014/main" id="{0F3B535C-70A1-4C65-8137-310A1050244A}"/>
-              </a:ext>
-            </a:extLst>
-          </p:cNvPr>
-          <p:cNvCxnSpPr>
-            <a:stCxn id="11" idx="3"/>
-            <a:endCxn id="10" idx="1"/>
-          </p:cNvCxnSpPr>
-          <p:nvPr/>
-        </p:nvCxnSpPr>
-        <p:spPr>
-          <a:xfrm flipV="1">
-            <a:off x="5514592" y="2805757"/>
-            <a:ext cx="886208" cy="6349"/>
-          </a:xfrm>
-          <a:prstGeom prst="bentConnector3">
-            <a:avLst>
-              <a:gd name="adj1" fmla="val 50000"/>
-            </a:avLst>
-          </a:prstGeom>
-          <a:ln w="19050">
-            <a:solidFill>
-              <a:srgbClr val="0070C0"/>
-            </a:solidFill>
-            <a:prstDash val="dash"/>
-            <a:headEnd type="none" w="med" len="med"/>
-            <a:tailEnd type="arrow" w="med" len="med"/>
-          </a:ln>
-          <a:effectLst/>
-        </p:spPr>
-        <p:style>
-          <a:lnRef idx="1">
-            <a:schemeClr val="accent2"/>
-          </a:lnRef>
-          <a:fillRef idx="2">
-            <a:schemeClr val="accent2"/>
-          </a:fillRef>
-          <a:effectRef idx="1">
-            <a:schemeClr val="accent2"/>
-          </a:effectRef>
-          <a:fontRef idx="minor">
-            <a:schemeClr val="dk1"/>
-          </a:fontRef>
-        </p:style>
-      </p:cxnSp>
-      <p:cxnSp>
-        <p:nvCxnSpPr>
-          <p:cNvPr id="13" name="Elbow Connector 40">
-            <a:extLst>
-              <a:ext uri="{FF2B5EF4-FFF2-40B4-BE49-F238E27FC236}">
-                <a16:creationId xmlns:a16="http://schemas.microsoft.com/office/drawing/2014/main" id="{63742429-D36D-48B4-A5D7-47B9A68DBE0B}"/>
-              </a:ext>
-            </a:extLst>
-          </p:cNvPr>
-          <p:cNvCxnSpPr>
-            <a:stCxn id="11" idx="2"/>
-            <a:endCxn id="14" idx="1"/>
-          </p:cNvCxnSpPr>
-          <p:nvPr/>
-        </p:nvCxnSpPr>
-        <p:spPr>
-          <a:xfrm rot="16200000" flipH="1">
-            <a:off x="4683507" y="3469401"/>
-            <a:ext cx="1162683" cy="290704"/>
-          </a:xfrm>
-          <a:prstGeom prst="bentConnector2">
-            <a:avLst/>
-          </a:prstGeom>
-          <a:ln w="19050">
-            <a:solidFill>
-              <a:srgbClr val="0070C0"/>
-            </a:solidFill>
-            <a:prstDash val="dash"/>
-            <a:headEnd type="none" w="med" len="med"/>
-            <a:tailEnd type="arrow" w="med" len="med"/>
-          </a:ln>
-          <a:effectLst/>
-        </p:spPr>
-        <p:style>
-          <a:lnRef idx="1">
-            <a:schemeClr val="accent2"/>
-          </a:lnRef>
-          <a:fillRef idx="2">
-            <a:schemeClr val="accent2"/>
-          </a:fillRef>
-          <a:effectRef idx="1">
-            <a:schemeClr val="accent2"/>
-          </a:effectRef>
-          <a:fontRef idx="minor">
-            <a:schemeClr val="dk1"/>
-          </a:fontRef>
-        </p:style>
-      </p:cxnSp>
-      <p:sp>
-        <p:nvSpPr>
-          <p:cNvPr id="14" name="Rectangle 22">
-            <a:extLst>
-              <a:ext uri="{FF2B5EF4-FFF2-40B4-BE49-F238E27FC236}">
-                <a16:creationId xmlns:a16="http://schemas.microsoft.com/office/drawing/2014/main" id="{AD37712C-4847-440A-A34B-C100EA912E82}"/>
-              </a:ext>
-            </a:extLst>
-          </p:cNvPr>
-          <p:cNvSpPr/>
-          <p:nvPr/>
-        </p:nvSpPr>
-        <p:spPr>
-          <a:xfrm>
-            <a:off x="5410200" y="4022715"/>
-            <a:ext cx="865573" cy="346760"/>
-          </a:xfrm>
-          <a:prstGeom prst="rect">
-            <a:avLst/>
-          </a:prstGeom>
-          <a:noFill/>
-          <a:ln w="19050">
-            <a:solidFill>
-              <a:srgbClr val="00B050"/>
-            </a:solidFill>
-          </a:ln>
-          <a:effectLst/>
-        </p:spPr>
-        <p:style>
-          <a:lnRef idx="1">
-            <a:schemeClr val="accent2"/>
-          </a:lnRef>
-          <a:fillRef idx="2">
-            <a:schemeClr val="accent2"/>
-          </a:fillRef>
-          <a:effectRef idx="1">
-            <a:schemeClr val="accent2"/>
-          </a:effectRef>
-          <a:fontRef idx="minor">
-            <a:schemeClr val="dk1"/>
-          </a:fontRef>
-        </p:style>
-        <p:txBody>
-          <a:bodyPr rtlCol="0" anchor="ctr"/>
-          <a:lstStyle/>
-          <a:p>
-            <a:pPr algn="ctr"/>
-            <a:r>
-              <a:rPr lang="en-US" sz="1050" dirty="0" err="1">
-                <a:solidFill>
-                  <a:srgbClr val="00B050"/>
-                </a:solidFill>
-              </a:rPr>
-              <a:t>StorageStub</a:t>
-            </a:r>
-            <a:endParaRPr lang="en-SG" sz="1050" dirty="0">
-              <a:solidFill>
-                <a:srgbClr val="00B050"/>
-              </a:solidFill>
-            </a:endParaRPr>
-          </a:p>
-        </p:txBody>
-      </p:sp>
-      <p:sp>
-        <p:nvSpPr>
-          <p:cNvPr id="15" name="Rectangle 22">
-            <a:extLst>
-              <a:ext uri="{FF2B5EF4-FFF2-40B4-BE49-F238E27FC236}">
-                <a16:creationId xmlns:a16="http://schemas.microsoft.com/office/drawing/2014/main" id="{D5EBFDEB-EE18-48E0-8931-C2DA4243B90F}"/>
-              </a:ext>
-            </a:extLst>
-          </p:cNvPr>
-          <p:cNvSpPr/>
-          <p:nvPr/>
-        </p:nvSpPr>
-        <p:spPr>
-          <a:xfrm>
-            <a:off x="6333836" y="4022715"/>
-            <a:ext cx="865573" cy="346760"/>
-          </a:xfrm>
-          <a:prstGeom prst="rect">
-            <a:avLst/>
-          </a:prstGeom>
-          <a:solidFill>
-            <a:srgbClr val="00B050"/>
-          </a:solidFill>
-          <a:ln w="19050">
-            <a:solidFill>
-              <a:srgbClr val="00B050"/>
-            </a:solidFill>
-          </a:ln>
-          <a:effectLst/>
-        </p:spPr>
-        <p:style>
-          <a:lnRef idx="1">
-            <a:schemeClr val="accent2"/>
-          </a:lnRef>
-          <a:fillRef idx="2">
-            <a:schemeClr val="accent2"/>
-          </a:fillRef>
-          <a:effectRef idx="1">
-            <a:schemeClr val="accent2"/>
-          </a:effectRef>
-          <a:fontRef idx="minor">
-            <a:schemeClr val="dk1"/>
-          </a:fontRef>
-        </p:style>
-        <p:txBody>
-          <a:bodyPr rtlCol="0" anchor="ctr"/>
-          <a:lstStyle/>
-          <a:p>
-            <a:pPr algn="ctr"/>
-            <a:r>
-              <a:rPr lang="en-US" sz="1050" dirty="0" err="1">
-                <a:solidFill>
-                  <a:schemeClr val="bg1"/>
-                </a:solidFill>
-              </a:rPr>
-              <a:t>StorageFile</a:t>
-            </a:r>
-            <a:endParaRPr lang="en-SG" sz="1050" dirty="0">
-              <a:solidFill>
-                <a:schemeClr val="bg1"/>
-              </a:solidFill>
-            </a:endParaRPr>
-          </a:p>
-        </p:txBody>
-      </p:sp>
-      <p:sp>
-        <p:nvSpPr>
-          <p:cNvPr id="16" name="Isosceles Triangle 102">
-            <a:extLst>
-              <a:ext uri="{FF2B5EF4-FFF2-40B4-BE49-F238E27FC236}">
-                <a16:creationId xmlns:a16="http://schemas.microsoft.com/office/drawing/2014/main" id="{0813B76B-D935-447A-AC87-0EEC47A680CE}"/>
-              </a:ext>
-            </a:extLst>
-          </p:cNvPr>
-          <p:cNvSpPr/>
-          <p:nvPr/>
-        </p:nvSpPr>
-        <p:spPr>
-          <a:xfrm rot="10800000" flipV="1">
-            <a:off x="6633672" y="3690798"/>
-            <a:ext cx="270504" cy="175523"/>
-          </a:xfrm>
-          <a:prstGeom prst="triangle">
-            <a:avLst/>
-          </a:prstGeom>
-          <a:ln>
-            <a:solidFill>
-              <a:srgbClr val="00B050"/>
-            </a:solidFill>
-          </a:ln>
-          <a:effectLst/>
-        </p:spPr>
-        <p:style>
-          <a:lnRef idx="1">
-            <a:schemeClr val="accent3"/>
-          </a:lnRef>
-          <a:fillRef idx="2">
-            <a:schemeClr val="accent3"/>
-          </a:fillRef>
-          <a:effectRef idx="1">
-            <a:schemeClr val="accent3"/>
-          </a:effectRef>
-          <a:fontRef idx="minor">
-            <a:schemeClr val="dk1"/>
-          </a:fontRef>
-        </p:style>
-        <p:txBody>
-          <a:bodyPr rtlCol="0" anchor="ctr"/>
-          <a:lstStyle/>
-          <a:p>
-            <a:pPr algn="ctr"/>
-            <a:endParaRPr lang="en-SG" sz="1050"/>
-          </a:p>
-        </p:txBody>
-      </p:sp>
-      <p:cxnSp>
-        <p:nvCxnSpPr>
-          <p:cNvPr id="17" name="Elbow Connector 103">
-            <a:extLst>
-              <a:ext uri="{FF2B5EF4-FFF2-40B4-BE49-F238E27FC236}">
-                <a16:creationId xmlns:a16="http://schemas.microsoft.com/office/drawing/2014/main" id="{4EFF085F-746C-4003-8E74-88AE226380E8}"/>
-              </a:ext>
-            </a:extLst>
-          </p:cNvPr>
-          <p:cNvCxnSpPr>
-            <a:stCxn id="16" idx="3"/>
-            <a:endCxn id="14" idx="0"/>
-          </p:cNvCxnSpPr>
-          <p:nvPr/>
-        </p:nvCxnSpPr>
-        <p:spPr>
-          <a:xfrm rot="5400000">
-            <a:off x="6227759" y="3481550"/>
-            <a:ext cx="156394" cy="925937"/>
-          </a:xfrm>
-          <a:prstGeom prst="bentConnector3">
-            <a:avLst>
-              <a:gd name="adj1" fmla="val 50000"/>
-            </a:avLst>
-          </a:prstGeom>
-          <a:ln w="19050">
-            <a:solidFill>
-              <a:srgbClr val="00B050"/>
-            </a:solidFill>
-            <a:prstDash val="solid"/>
-            <a:headEnd type="none" w="med" len="med"/>
-            <a:tailEnd type="none" w="med" len="med"/>
-          </a:ln>
-          <a:effectLst/>
-        </p:spPr>
-        <p:style>
-          <a:lnRef idx="1">
-            <a:schemeClr val="accent2"/>
-          </a:lnRef>
-          <a:fillRef idx="2">
-            <a:schemeClr val="accent2"/>
-          </a:fillRef>
-          <a:effectRef idx="1">
-            <a:schemeClr val="accent2"/>
-          </a:effectRef>
-          <a:fontRef idx="minor">
-            <a:schemeClr val="dk1"/>
-          </a:fontRef>
-        </p:style>
-      </p:cxnSp>
-      <p:cxnSp>
-        <p:nvCxnSpPr>
-          <p:cNvPr id="18" name="Elbow Connector 103">
-            <a:extLst>
-              <a:ext uri="{FF2B5EF4-FFF2-40B4-BE49-F238E27FC236}">
-                <a16:creationId xmlns:a16="http://schemas.microsoft.com/office/drawing/2014/main" id="{E47C4E7F-8C8C-40CC-AA1D-EACBB6BCA94B}"/>
-              </a:ext>
-            </a:extLst>
-          </p:cNvPr>
-          <p:cNvCxnSpPr>
-            <a:stCxn id="16" idx="3"/>
-            <a:endCxn id="15" idx="0"/>
-          </p:cNvCxnSpPr>
-          <p:nvPr/>
-        </p:nvCxnSpPr>
-        <p:spPr>
-          <a:xfrm rot="5400000">
-            <a:off x="6689577" y="3943368"/>
-            <a:ext cx="156394" cy="2301"/>
-          </a:xfrm>
-          <a:prstGeom prst="bentConnector3">
-            <a:avLst>
-              <a:gd name="adj1" fmla="val 50000"/>
-            </a:avLst>
-          </a:prstGeom>
-          <a:ln w="19050">
-            <a:solidFill>
-              <a:srgbClr val="00B050"/>
-            </a:solidFill>
-            <a:prstDash val="solid"/>
-            <a:headEnd type="none" w="med" len="med"/>
-            <a:tailEnd type="none" w="med" len="med"/>
-          </a:ln>
-          <a:effectLst/>
-        </p:spPr>
-        <p:style>
-          <a:lnRef idx="1">
-            <a:schemeClr val="accent2"/>
-          </a:lnRef>
-          <a:fillRef idx="2">
-            <a:schemeClr val="accent2"/>
-          </a:fillRef>
-          <a:effectRef idx="1">
-            <a:schemeClr val="accent2"/>
-          </a:effectRef>
-          <a:fontRef idx="minor">
-            <a:schemeClr val="dk1"/>
-          </a:fontRef>
-        </p:style>
-      </p:cxnSp>
-      <p:sp>
-        <p:nvSpPr>
           <p:cNvPr id="19" name="Striped Right Arrow 26">
             <a:extLst>
               <a:ext uri="{FF2B5EF4-FFF2-40B4-BE49-F238E27FC236}">
@@ -4417,7 +3724,7 @@
         </p:nvSpPr>
         <p:spPr>
           <a:xfrm>
-            <a:off x="4075209" y="3027063"/>
+            <a:off x="4169428" y="3160960"/>
             <a:ext cx="304800" cy="269627"/>
           </a:xfrm>
           <a:prstGeom prst="stripedRightArrow">
@@ -4457,6 +3764,854 @@
           </a:p>
         </p:txBody>
       </p:sp>
+      <p:sp>
+        <p:nvSpPr>
+          <p:cNvPr id="31" name="Rectangle 22">
+            <a:extLst>
+              <a:ext uri="{FF2B5EF4-FFF2-40B4-BE49-F238E27FC236}">
+                <a16:creationId xmlns:a16="http://schemas.microsoft.com/office/drawing/2014/main" id="{8B211064-D791-43E3-8590-EAB57D36EF35}"/>
+              </a:ext>
+            </a:extLst>
+          </p:cNvPr>
+          <p:cNvSpPr/>
+          <p:nvPr/>
+        </p:nvSpPr>
+        <p:spPr>
+          <a:xfrm>
+            <a:off x="2834523" y="3302644"/>
+            <a:ext cx="1086064" cy="346760"/>
+          </a:xfrm>
+          <a:prstGeom prst="rect">
+            <a:avLst/>
+          </a:prstGeom>
+          <a:solidFill>
+            <a:srgbClr val="E46C0A"/>
+          </a:solidFill>
+          <a:ln w="19050">
+            <a:noFill/>
+          </a:ln>
+          <a:effectLst/>
+        </p:spPr>
+        <p:style>
+          <a:lnRef idx="1">
+            <a:schemeClr val="accent2"/>
+          </a:lnRef>
+          <a:fillRef idx="2">
+            <a:schemeClr val="accent2"/>
+          </a:fillRef>
+          <a:effectRef idx="1">
+            <a:schemeClr val="accent2"/>
+          </a:effectRef>
+          <a:fontRef idx="minor">
+            <a:schemeClr val="dk1"/>
+          </a:fontRef>
+        </p:style>
+        <p:txBody>
+          <a:bodyPr rtlCol="0" anchor="ctr"/>
+          <a:lstStyle/>
+          <a:p>
+            <a:pPr algn="ctr"/>
+            <a:r>
+              <a:rPr lang="en-SG" sz="1050" dirty="0">
+                <a:solidFill>
+                  <a:schemeClr val="bg1"/>
+                </a:solidFill>
+              </a:rPr>
+              <a:t>&lt;&lt;interface&gt;&gt;</a:t>
+            </a:r>
+          </a:p>
+          <a:p>
+            <a:pPr algn="ctr"/>
+            <a:r>
+              <a:rPr lang="en-SG" sz="1050" dirty="0">
+                <a:solidFill>
+                  <a:schemeClr val="bg1"/>
+                </a:solidFill>
+              </a:rPr>
+              <a:t>Storage</a:t>
+            </a:r>
+          </a:p>
+        </p:txBody>
+      </p:sp>
+      <p:sp>
+        <p:nvSpPr>
+          <p:cNvPr id="35" name="Rectangle 22">
+            <a:extLst>
+              <a:ext uri="{FF2B5EF4-FFF2-40B4-BE49-F238E27FC236}">
+                <a16:creationId xmlns:a16="http://schemas.microsoft.com/office/drawing/2014/main" id="{71C5FD4D-2BA1-4419-95ED-AFD90725AD53}"/>
+              </a:ext>
+            </a:extLst>
+          </p:cNvPr>
+          <p:cNvSpPr/>
+          <p:nvPr/>
+        </p:nvSpPr>
+        <p:spPr>
+          <a:xfrm>
+            <a:off x="2823913" y="3991187"/>
+            <a:ext cx="1096673" cy="346760"/>
+          </a:xfrm>
+          <a:prstGeom prst="rect">
+            <a:avLst/>
+          </a:prstGeom>
+          <a:solidFill>
+            <a:srgbClr val="E46C0A"/>
+          </a:solidFill>
+          <a:ln w="19050">
+            <a:noFill/>
+          </a:ln>
+          <a:effectLst/>
+        </p:spPr>
+        <p:style>
+          <a:lnRef idx="1">
+            <a:schemeClr val="accent2"/>
+          </a:lnRef>
+          <a:fillRef idx="2">
+            <a:schemeClr val="accent2"/>
+          </a:fillRef>
+          <a:effectRef idx="1">
+            <a:schemeClr val="accent2"/>
+          </a:effectRef>
+          <a:fontRef idx="minor">
+            <a:schemeClr val="dk1"/>
+          </a:fontRef>
+        </p:style>
+        <p:txBody>
+          <a:bodyPr rtlCol="0" anchor="ctr"/>
+          <a:lstStyle/>
+          <a:p>
+            <a:pPr algn="ctr"/>
+            <a:r>
+              <a:rPr lang="en-US" sz="1050" dirty="0" err="1">
+                <a:solidFill>
+                  <a:schemeClr val="bg1"/>
+                </a:solidFill>
+              </a:rPr>
+              <a:t>StorageManager</a:t>
+            </a:r>
+            <a:endParaRPr lang="en-SG" sz="1050" dirty="0">
+              <a:solidFill>
+                <a:schemeClr val="bg1"/>
+              </a:solidFill>
+            </a:endParaRPr>
+          </a:p>
+        </p:txBody>
+      </p:sp>
+      <p:cxnSp>
+        <p:nvCxnSpPr>
+          <p:cNvPr id="36" name="Elbow Connector 103">
+            <a:extLst>
+              <a:ext uri="{FF2B5EF4-FFF2-40B4-BE49-F238E27FC236}">
+                <a16:creationId xmlns:a16="http://schemas.microsoft.com/office/drawing/2014/main" id="{B5F242EC-7AE4-40E2-84DE-5A910F13290E}"/>
+              </a:ext>
+            </a:extLst>
+          </p:cNvPr>
+          <p:cNvCxnSpPr>
+            <a:cxnSpLocks/>
+            <a:stCxn id="31" idx="2"/>
+            <a:endCxn id="35" idx="0"/>
+          </p:cNvCxnSpPr>
+          <p:nvPr/>
+        </p:nvCxnSpPr>
+        <p:spPr>
+          <a:xfrm flipH="1">
+            <a:off x="3372250" y="3649404"/>
+            <a:ext cx="5305" cy="341783"/>
+          </a:xfrm>
+          <a:prstGeom prst="straightConnector1">
+            <a:avLst/>
+          </a:prstGeom>
+          <a:ln w="19050">
+            <a:solidFill>
+              <a:srgbClr val="E46C0A"/>
+            </a:solidFill>
+            <a:prstDash val="sysDot"/>
+            <a:headEnd type="none" w="med" len="med"/>
+            <a:tailEnd type="none" w="med" len="med"/>
+          </a:ln>
+          <a:effectLst/>
+        </p:spPr>
+        <p:style>
+          <a:lnRef idx="1">
+            <a:schemeClr val="accent2"/>
+          </a:lnRef>
+          <a:fillRef idx="2">
+            <a:schemeClr val="accent2"/>
+          </a:fillRef>
+          <a:effectRef idx="1">
+            <a:schemeClr val="accent2"/>
+          </a:effectRef>
+          <a:fontRef idx="minor">
+            <a:schemeClr val="dk1"/>
+          </a:fontRef>
+        </p:style>
+      </p:cxnSp>
+      <p:sp>
+        <p:nvSpPr>
+          <p:cNvPr id="39" name="Isosceles Triangle 102">
+            <a:extLst>
+              <a:ext uri="{FF2B5EF4-FFF2-40B4-BE49-F238E27FC236}">
+                <a16:creationId xmlns:a16="http://schemas.microsoft.com/office/drawing/2014/main" id="{47F4B572-F204-4267-91B6-118B8B7DCB8C}"/>
+              </a:ext>
+            </a:extLst>
+          </p:cNvPr>
+          <p:cNvSpPr/>
+          <p:nvPr/>
+        </p:nvSpPr>
+        <p:spPr>
+          <a:xfrm rot="10800000" flipV="1">
+            <a:off x="3242302" y="3649404"/>
+            <a:ext cx="270504" cy="175523"/>
+          </a:xfrm>
+          <a:prstGeom prst="triangle">
+            <a:avLst/>
+          </a:prstGeom>
+          <a:solidFill>
+            <a:srgbClr val="E46C0A"/>
+          </a:solidFill>
+          <a:ln>
+            <a:noFill/>
+          </a:ln>
+          <a:effectLst/>
+        </p:spPr>
+        <p:style>
+          <a:lnRef idx="1">
+            <a:schemeClr val="accent3"/>
+          </a:lnRef>
+          <a:fillRef idx="2">
+            <a:schemeClr val="accent3"/>
+          </a:fillRef>
+          <a:effectRef idx="1">
+            <a:schemeClr val="accent3"/>
+          </a:effectRef>
+          <a:fontRef idx="minor">
+            <a:schemeClr val="dk1"/>
+          </a:fontRef>
+        </p:style>
+        <p:txBody>
+          <a:bodyPr rtlCol="0" anchor="ctr"/>
+          <a:lstStyle/>
+          <a:p>
+            <a:pPr algn="ctr"/>
+            <a:endParaRPr lang="en-SG" sz="1050"/>
+          </a:p>
+        </p:txBody>
+      </p:sp>
+      <p:cxnSp>
+        <p:nvCxnSpPr>
+          <p:cNvPr id="60" name="Elbow Connector 40">
+            <a:extLst>
+              <a:ext uri="{FF2B5EF4-FFF2-40B4-BE49-F238E27FC236}">
+                <a16:creationId xmlns:a16="http://schemas.microsoft.com/office/drawing/2014/main" id="{F45F6AE5-FD42-4182-A2CB-2DC68B485615}"/>
+              </a:ext>
+            </a:extLst>
+          </p:cNvPr>
+          <p:cNvCxnSpPr>
+            <a:cxnSpLocks/>
+            <a:stCxn id="61" idx="2"/>
+            <a:endCxn id="65" idx="0"/>
+          </p:cNvCxnSpPr>
+          <p:nvPr/>
+        </p:nvCxnSpPr>
+        <p:spPr>
+          <a:xfrm>
+            <a:off x="7119701" y="3033412"/>
+            <a:ext cx="1" cy="269232"/>
+          </a:xfrm>
+          <a:prstGeom prst="straightConnector1">
+            <a:avLst/>
+          </a:prstGeom>
+          <a:ln w="19050">
+            <a:solidFill>
+              <a:srgbClr val="0070C0"/>
+            </a:solidFill>
+            <a:headEnd type="none" w="med" len="med"/>
+            <a:tailEnd type="arrow" w="med" len="med"/>
+          </a:ln>
+          <a:effectLst/>
+        </p:spPr>
+        <p:style>
+          <a:lnRef idx="1">
+            <a:schemeClr val="accent2"/>
+          </a:lnRef>
+          <a:fillRef idx="2">
+            <a:schemeClr val="accent2"/>
+          </a:fillRef>
+          <a:effectRef idx="1">
+            <a:schemeClr val="accent2"/>
+          </a:effectRef>
+          <a:fontRef idx="minor">
+            <a:schemeClr val="dk1"/>
+          </a:fontRef>
+        </p:style>
+      </p:cxnSp>
+      <p:sp>
+        <p:nvSpPr>
+          <p:cNvPr id="61" name="Rectangle 65">
+            <a:extLst>
+              <a:ext uri="{FF2B5EF4-FFF2-40B4-BE49-F238E27FC236}">
+                <a16:creationId xmlns:a16="http://schemas.microsoft.com/office/drawing/2014/main" id="{72466882-18BF-4B80-B21A-102533E92698}"/>
+              </a:ext>
+            </a:extLst>
+          </p:cNvPr>
+          <p:cNvSpPr/>
+          <p:nvPr/>
+        </p:nvSpPr>
+        <p:spPr>
+          <a:xfrm>
+            <a:off x="6576669" y="2590800"/>
+            <a:ext cx="1086064" cy="442612"/>
+          </a:xfrm>
+          <a:prstGeom prst="rect">
+            <a:avLst/>
+          </a:prstGeom>
+          <a:solidFill>
+            <a:srgbClr val="0070C0"/>
+          </a:solidFill>
+          <a:ln w="19050">
+            <a:solidFill>
+              <a:srgbClr val="0070C0"/>
+            </a:solidFill>
+          </a:ln>
+          <a:effectLst/>
+        </p:spPr>
+        <p:style>
+          <a:lnRef idx="1">
+            <a:schemeClr val="accent2"/>
+          </a:lnRef>
+          <a:fillRef idx="2">
+            <a:schemeClr val="accent2"/>
+          </a:fillRef>
+          <a:effectRef idx="1">
+            <a:schemeClr val="accent2"/>
+          </a:effectRef>
+          <a:fontRef idx="minor">
+            <a:schemeClr val="dk1"/>
+          </a:fontRef>
+        </p:style>
+        <p:txBody>
+          <a:bodyPr rtlCol="0" anchor="ctr"/>
+          <a:lstStyle/>
+          <a:p>
+            <a:pPr algn="ctr"/>
+            <a:r>
+              <a:rPr lang="en-US" sz="1050" dirty="0" err="1">
+                <a:solidFill>
+                  <a:schemeClr val="bg1"/>
+                </a:solidFill>
+              </a:rPr>
+              <a:t>LogicManager</a:t>
+            </a:r>
+            <a:endParaRPr lang="en-SG" sz="1050" dirty="0">
+              <a:solidFill>
+                <a:schemeClr val="bg1"/>
+              </a:solidFill>
+            </a:endParaRPr>
+          </a:p>
+        </p:txBody>
+      </p:sp>
+      <p:sp>
+        <p:nvSpPr>
+          <p:cNvPr id="62" name="Rectangle 65">
+            <a:extLst>
+              <a:ext uri="{FF2B5EF4-FFF2-40B4-BE49-F238E27FC236}">
+                <a16:creationId xmlns:a16="http://schemas.microsoft.com/office/drawing/2014/main" id="{F947A222-B298-401B-979B-F2321083EC04}"/>
+              </a:ext>
+            </a:extLst>
+          </p:cNvPr>
+          <p:cNvSpPr/>
+          <p:nvPr/>
+        </p:nvSpPr>
+        <p:spPr>
+          <a:xfrm>
+            <a:off x="4648200" y="2590800"/>
+            <a:ext cx="1207795" cy="442612"/>
+          </a:xfrm>
+          <a:prstGeom prst="rect">
+            <a:avLst/>
+          </a:prstGeom>
+          <a:ln/>
+        </p:spPr>
+        <p:style>
+          <a:lnRef idx="2">
+            <a:schemeClr val="accent1"/>
+          </a:lnRef>
+          <a:fillRef idx="1">
+            <a:schemeClr val="lt1"/>
+          </a:fillRef>
+          <a:effectRef idx="0">
+            <a:schemeClr val="accent1"/>
+          </a:effectRef>
+          <a:fontRef idx="minor">
+            <a:schemeClr val="dk1"/>
+          </a:fontRef>
+        </p:style>
+        <p:txBody>
+          <a:bodyPr rtlCol="0" anchor="ctr"/>
+          <a:lstStyle/>
+          <a:p>
+            <a:pPr algn="ctr"/>
+            <a:r>
+              <a:rPr lang="en-US" sz="1050" dirty="0" err="1">
+                <a:solidFill>
+                  <a:srgbClr val="0070C0"/>
+                </a:solidFill>
+              </a:rPr>
+              <a:t>LogicManagerTest</a:t>
+            </a:r>
+            <a:endParaRPr lang="en-SG" sz="1050" dirty="0">
+              <a:solidFill>
+                <a:srgbClr val="0070C0"/>
+              </a:solidFill>
+            </a:endParaRPr>
+          </a:p>
+        </p:txBody>
+      </p:sp>
+      <p:cxnSp>
+        <p:nvCxnSpPr>
+          <p:cNvPr id="63" name="Elbow Connector 40">
+            <a:extLst>
+              <a:ext uri="{FF2B5EF4-FFF2-40B4-BE49-F238E27FC236}">
+                <a16:creationId xmlns:a16="http://schemas.microsoft.com/office/drawing/2014/main" id="{85F64AA0-01D8-4346-BE39-608D611B997F}"/>
+              </a:ext>
+            </a:extLst>
+          </p:cNvPr>
+          <p:cNvCxnSpPr>
+            <a:cxnSpLocks/>
+            <a:stCxn id="62" idx="3"/>
+            <a:endCxn id="61" idx="1"/>
+          </p:cNvCxnSpPr>
+          <p:nvPr/>
+        </p:nvCxnSpPr>
+        <p:spPr>
+          <a:xfrm>
+            <a:off x="5855995" y="2812106"/>
+            <a:ext cx="720674" cy="0"/>
+          </a:xfrm>
+          <a:prstGeom prst="straightConnector1">
+            <a:avLst/>
+          </a:prstGeom>
+          <a:ln w="19050">
+            <a:solidFill>
+              <a:srgbClr val="0070C0"/>
+            </a:solidFill>
+            <a:prstDash val="dash"/>
+            <a:headEnd type="none" w="med" len="med"/>
+            <a:tailEnd type="arrow" w="med" len="med"/>
+          </a:ln>
+          <a:effectLst/>
+        </p:spPr>
+        <p:style>
+          <a:lnRef idx="1">
+            <a:schemeClr val="accent2"/>
+          </a:lnRef>
+          <a:fillRef idx="2">
+            <a:schemeClr val="accent2"/>
+          </a:fillRef>
+          <a:effectRef idx="1">
+            <a:schemeClr val="accent2"/>
+          </a:effectRef>
+          <a:fontRef idx="minor">
+            <a:schemeClr val="dk1"/>
+          </a:fontRef>
+        </p:style>
+      </p:cxnSp>
+      <p:cxnSp>
+        <p:nvCxnSpPr>
+          <p:cNvPr id="64" name="Elbow Connector 40">
+            <a:extLst>
+              <a:ext uri="{FF2B5EF4-FFF2-40B4-BE49-F238E27FC236}">
+                <a16:creationId xmlns:a16="http://schemas.microsoft.com/office/drawing/2014/main" id="{E3CF70CB-78B1-4CEB-BC63-3135BAC7846F}"/>
+              </a:ext>
+            </a:extLst>
+          </p:cNvPr>
+          <p:cNvCxnSpPr>
+            <a:cxnSpLocks/>
+            <a:stCxn id="62" idx="2"/>
+            <a:endCxn id="72" idx="1"/>
+          </p:cNvCxnSpPr>
+          <p:nvPr/>
+        </p:nvCxnSpPr>
+        <p:spPr>
+          <a:xfrm rot="16200000" flipH="1">
+            <a:off x="4831498" y="3454011"/>
+            <a:ext cx="1131155" cy="289955"/>
+          </a:xfrm>
+          <a:prstGeom prst="bentConnector2">
+            <a:avLst/>
+          </a:prstGeom>
+          <a:ln w="19050">
+            <a:solidFill>
+              <a:srgbClr val="0070C0"/>
+            </a:solidFill>
+            <a:prstDash val="dash"/>
+            <a:headEnd type="none" w="med" len="med"/>
+            <a:tailEnd type="arrow" w="med" len="med"/>
+          </a:ln>
+          <a:effectLst/>
+        </p:spPr>
+        <p:style>
+          <a:lnRef idx="1">
+            <a:schemeClr val="accent2"/>
+          </a:lnRef>
+          <a:fillRef idx="2">
+            <a:schemeClr val="accent2"/>
+          </a:fillRef>
+          <a:effectRef idx="1">
+            <a:schemeClr val="accent2"/>
+          </a:effectRef>
+          <a:fontRef idx="minor">
+            <a:schemeClr val="dk1"/>
+          </a:fontRef>
+        </p:style>
+      </p:cxnSp>
+      <p:sp>
+        <p:nvSpPr>
+          <p:cNvPr id="65" name="Rectangle 22">
+            <a:extLst>
+              <a:ext uri="{FF2B5EF4-FFF2-40B4-BE49-F238E27FC236}">
+                <a16:creationId xmlns:a16="http://schemas.microsoft.com/office/drawing/2014/main" id="{21FAC56E-298A-4FCF-AC89-E08818CF8F0F}"/>
+              </a:ext>
+            </a:extLst>
+          </p:cNvPr>
+          <p:cNvSpPr/>
+          <p:nvPr/>
+        </p:nvSpPr>
+        <p:spPr>
+          <a:xfrm>
+            <a:off x="6576670" y="3302644"/>
+            <a:ext cx="1086064" cy="346760"/>
+          </a:xfrm>
+          <a:prstGeom prst="rect">
+            <a:avLst/>
+          </a:prstGeom>
+          <a:solidFill>
+            <a:srgbClr val="E46C0A"/>
+          </a:solidFill>
+          <a:ln w="19050">
+            <a:noFill/>
+          </a:ln>
+          <a:effectLst/>
+        </p:spPr>
+        <p:style>
+          <a:lnRef idx="1">
+            <a:schemeClr val="accent2"/>
+          </a:lnRef>
+          <a:fillRef idx="2">
+            <a:schemeClr val="accent2"/>
+          </a:fillRef>
+          <a:effectRef idx="1">
+            <a:schemeClr val="accent2"/>
+          </a:effectRef>
+          <a:fontRef idx="minor">
+            <a:schemeClr val="dk1"/>
+          </a:fontRef>
+        </p:style>
+        <p:txBody>
+          <a:bodyPr rtlCol="0" anchor="ctr"/>
+          <a:lstStyle/>
+          <a:p>
+            <a:pPr algn="ctr"/>
+            <a:r>
+              <a:rPr lang="en-SG" sz="1050" dirty="0">
+                <a:solidFill>
+                  <a:schemeClr val="bg1"/>
+                </a:solidFill>
+              </a:rPr>
+              <a:t>&lt;&lt;interface&gt;&gt;</a:t>
+            </a:r>
+          </a:p>
+          <a:p>
+            <a:pPr algn="ctr"/>
+            <a:r>
+              <a:rPr lang="en-SG" sz="1050" dirty="0">
+                <a:solidFill>
+                  <a:schemeClr val="bg1"/>
+                </a:solidFill>
+              </a:rPr>
+              <a:t>Storage</a:t>
+            </a:r>
+          </a:p>
+        </p:txBody>
+      </p:sp>
+      <p:sp>
+        <p:nvSpPr>
+          <p:cNvPr id="66" name="Rectangle 22">
+            <a:extLst>
+              <a:ext uri="{FF2B5EF4-FFF2-40B4-BE49-F238E27FC236}">
+                <a16:creationId xmlns:a16="http://schemas.microsoft.com/office/drawing/2014/main" id="{A9381E6E-B90B-4235-A186-68E5819D8177}"/>
+              </a:ext>
+            </a:extLst>
+          </p:cNvPr>
+          <p:cNvSpPr/>
+          <p:nvPr/>
+        </p:nvSpPr>
+        <p:spPr>
+          <a:xfrm>
+            <a:off x="6576669" y="3981662"/>
+            <a:ext cx="1096673" cy="346760"/>
+          </a:xfrm>
+          <a:prstGeom prst="rect">
+            <a:avLst/>
+          </a:prstGeom>
+          <a:solidFill>
+            <a:srgbClr val="E46C0A"/>
+          </a:solidFill>
+          <a:ln w="19050">
+            <a:noFill/>
+          </a:ln>
+          <a:effectLst/>
+        </p:spPr>
+        <p:style>
+          <a:lnRef idx="1">
+            <a:schemeClr val="accent2"/>
+          </a:lnRef>
+          <a:fillRef idx="2">
+            <a:schemeClr val="accent2"/>
+          </a:fillRef>
+          <a:effectRef idx="1">
+            <a:schemeClr val="accent2"/>
+          </a:effectRef>
+          <a:fontRef idx="minor">
+            <a:schemeClr val="dk1"/>
+          </a:fontRef>
+        </p:style>
+        <p:txBody>
+          <a:bodyPr rtlCol="0" anchor="ctr"/>
+          <a:lstStyle/>
+          <a:p>
+            <a:pPr algn="ctr"/>
+            <a:r>
+              <a:rPr lang="en-US" sz="1050" dirty="0" err="1">
+                <a:solidFill>
+                  <a:schemeClr val="bg1"/>
+                </a:solidFill>
+              </a:rPr>
+              <a:t>StorageManager</a:t>
+            </a:r>
+            <a:endParaRPr lang="en-SG" sz="1050" dirty="0">
+              <a:solidFill>
+                <a:schemeClr val="bg1"/>
+              </a:solidFill>
+            </a:endParaRPr>
+          </a:p>
+        </p:txBody>
+      </p:sp>
+      <p:sp>
+        <p:nvSpPr>
+          <p:cNvPr id="67" name="Isosceles Triangle 102">
+            <a:extLst>
+              <a:ext uri="{FF2B5EF4-FFF2-40B4-BE49-F238E27FC236}">
+                <a16:creationId xmlns:a16="http://schemas.microsoft.com/office/drawing/2014/main" id="{DFC2DE6F-4466-4602-9A35-7FA997A6F3A9}"/>
+              </a:ext>
+            </a:extLst>
+          </p:cNvPr>
+          <p:cNvSpPr/>
+          <p:nvPr/>
+        </p:nvSpPr>
+        <p:spPr>
+          <a:xfrm rot="10800000" flipV="1">
+            <a:off x="6984449" y="3649404"/>
+            <a:ext cx="270504" cy="175523"/>
+          </a:xfrm>
+          <a:prstGeom prst="triangle">
+            <a:avLst/>
+          </a:prstGeom>
+          <a:solidFill>
+            <a:srgbClr val="E46C0A"/>
+          </a:solidFill>
+          <a:ln>
+            <a:noFill/>
+          </a:ln>
+          <a:effectLst/>
+        </p:spPr>
+        <p:style>
+          <a:lnRef idx="1">
+            <a:schemeClr val="accent3"/>
+          </a:lnRef>
+          <a:fillRef idx="2">
+            <a:schemeClr val="accent3"/>
+          </a:fillRef>
+          <a:effectRef idx="1">
+            <a:schemeClr val="accent3"/>
+          </a:effectRef>
+          <a:fontRef idx="minor">
+            <a:schemeClr val="dk1"/>
+          </a:fontRef>
+        </p:style>
+        <p:txBody>
+          <a:bodyPr rtlCol="0" anchor="ctr"/>
+          <a:lstStyle/>
+          <a:p>
+            <a:pPr algn="ctr"/>
+            <a:endParaRPr lang="en-SG" sz="1050"/>
+          </a:p>
+        </p:txBody>
+      </p:sp>
+      <p:cxnSp>
+        <p:nvCxnSpPr>
+          <p:cNvPr id="68" name="Elbow Connector 103">
+            <a:extLst>
+              <a:ext uri="{FF2B5EF4-FFF2-40B4-BE49-F238E27FC236}">
+                <a16:creationId xmlns:a16="http://schemas.microsoft.com/office/drawing/2014/main" id="{C493ACBE-A71A-40AD-8852-411A48EE50F1}"/>
+              </a:ext>
+            </a:extLst>
+          </p:cNvPr>
+          <p:cNvCxnSpPr>
+            <a:cxnSpLocks/>
+            <a:stCxn id="67" idx="3"/>
+            <a:endCxn id="66" idx="0"/>
+          </p:cNvCxnSpPr>
+          <p:nvPr/>
+        </p:nvCxnSpPr>
+        <p:spPr>
+          <a:xfrm>
+            <a:off x="7119701" y="3824927"/>
+            <a:ext cx="5305" cy="156735"/>
+          </a:xfrm>
+          <a:prstGeom prst="straightConnector1">
+            <a:avLst/>
+          </a:prstGeom>
+          <a:ln w="19050">
+            <a:solidFill>
+              <a:srgbClr val="E46C0A"/>
+            </a:solidFill>
+            <a:prstDash val="sysDot"/>
+            <a:headEnd type="none" w="med" len="med"/>
+            <a:tailEnd type="none" w="med" len="med"/>
+          </a:ln>
+          <a:effectLst/>
+        </p:spPr>
+        <p:style>
+          <a:lnRef idx="1">
+            <a:schemeClr val="accent2"/>
+          </a:lnRef>
+          <a:fillRef idx="2">
+            <a:schemeClr val="accent2"/>
+          </a:fillRef>
+          <a:effectRef idx="1">
+            <a:schemeClr val="accent2"/>
+          </a:effectRef>
+          <a:fontRef idx="minor">
+            <a:schemeClr val="dk1"/>
+          </a:fontRef>
+        </p:style>
+      </p:cxnSp>
+      <p:sp>
+        <p:nvSpPr>
+          <p:cNvPr id="72" name="Rectangle 22">
+            <a:extLst>
+              <a:ext uri="{FF2B5EF4-FFF2-40B4-BE49-F238E27FC236}">
+                <a16:creationId xmlns:a16="http://schemas.microsoft.com/office/drawing/2014/main" id="{23D2B983-5B42-4491-B1F8-2D000AA761B2}"/>
+              </a:ext>
+            </a:extLst>
+          </p:cNvPr>
+          <p:cNvSpPr/>
+          <p:nvPr/>
+        </p:nvSpPr>
+        <p:spPr>
+          <a:xfrm>
+            <a:off x="5542053" y="3991187"/>
+            <a:ext cx="894989" cy="346760"/>
+          </a:xfrm>
+          <a:prstGeom prst="rect">
+            <a:avLst/>
+          </a:prstGeom>
+          <a:solidFill>
+            <a:schemeClr val="bg1"/>
+          </a:solidFill>
+          <a:ln w="19050">
+            <a:solidFill>
+              <a:srgbClr val="E46C0A"/>
+            </a:solidFill>
+          </a:ln>
+          <a:effectLst/>
+        </p:spPr>
+        <p:style>
+          <a:lnRef idx="1">
+            <a:schemeClr val="accent2"/>
+          </a:lnRef>
+          <a:fillRef idx="2">
+            <a:schemeClr val="accent2"/>
+          </a:fillRef>
+          <a:effectRef idx="1">
+            <a:schemeClr val="accent2"/>
+          </a:effectRef>
+          <a:fontRef idx="minor">
+            <a:schemeClr val="dk1"/>
+          </a:fontRef>
+        </p:style>
+        <p:txBody>
+          <a:bodyPr rtlCol="0" anchor="ctr"/>
+          <a:lstStyle/>
+          <a:p>
+            <a:pPr algn="ctr"/>
+            <a:r>
+              <a:rPr lang="en-US" sz="1050" dirty="0" err="1">
+                <a:solidFill>
+                  <a:srgbClr val="E46C0A"/>
+                </a:solidFill>
+              </a:rPr>
+              <a:t>StorageStub</a:t>
+            </a:r>
+            <a:endParaRPr lang="en-SG" sz="1050" dirty="0">
+              <a:solidFill>
+                <a:srgbClr val="E46C0A"/>
+              </a:solidFill>
+            </a:endParaRPr>
+          </a:p>
+        </p:txBody>
+      </p:sp>
+      <p:cxnSp>
+        <p:nvCxnSpPr>
+          <p:cNvPr id="78" name="Elbow Connector 103">
+            <a:extLst>
+              <a:ext uri="{FF2B5EF4-FFF2-40B4-BE49-F238E27FC236}">
+                <a16:creationId xmlns:a16="http://schemas.microsoft.com/office/drawing/2014/main" id="{194271AA-905E-4115-91FC-86299E8AFD51}"/>
+              </a:ext>
+            </a:extLst>
+          </p:cNvPr>
+          <p:cNvCxnSpPr>
+            <a:cxnSpLocks/>
+            <a:stCxn id="67" idx="3"/>
+            <a:endCxn id="72" idx="0"/>
+          </p:cNvCxnSpPr>
+          <p:nvPr/>
+        </p:nvCxnSpPr>
+        <p:spPr>
+          <a:xfrm rot="5400000">
+            <a:off x="6471495" y="3342981"/>
+            <a:ext cx="166260" cy="1130153"/>
+          </a:xfrm>
+          <a:prstGeom prst="bentConnector3">
+            <a:avLst>
+              <a:gd name="adj1" fmla="val 50000"/>
+            </a:avLst>
+          </a:prstGeom>
+          <a:ln w="19050">
+            <a:solidFill>
+              <a:srgbClr val="E46C0A"/>
+            </a:solidFill>
+            <a:prstDash val="sysDot"/>
+            <a:headEnd type="none" w="med" len="med"/>
+            <a:tailEnd type="none" w="med" len="med"/>
+          </a:ln>
+          <a:effectLst/>
+        </p:spPr>
+        <p:style>
+          <a:lnRef idx="1">
+            <a:schemeClr val="accent2"/>
+          </a:lnRef>
+          <a:fillRef idx="2">
+            <a:schemeClr val="accent2"/>
+          </a:fillRef>
+          <a:effectRef idx="1">
+            <a:schemeClr val="accent2"/>
+          </a:effectRef>
+          <a:fontRef idx="minor">
+            <a:schemeClr val="dk1"/>
+          </a:fontRef>
+        </p:style>
+      </p:cxnSp>
     </p:spTree>
     <p:extLst>
       <p:ext uri="{BB962C8B-B14F-4D97-AF65-F5344CB8AC3E}">

</xml_diff>